<commit_message>
Remove intelligent kiosk sample
</commit_message>
<xml_diff>
--- a/Slides/Codefundo - Introduction.pptx
+++ b/Slides/Codefundo - Introduction.pptx
@@ -7,10 +7,10 @@
     <p:sldMasterId id="2147483710" r:id="rId6"/>
   </p:sldMasterIdLst>
   <p:notesMasterIdLst>
-    <p:notesMasterId r:id="rId18"/>
+    <p:notesMasterId r:id="rId17"/>
   </p:notesMasterIdLst>
   <p:handoutMasterIdLst>
-    <p:handoutMasterId r:id="rId19"/>
+    <p:handoutMasterId r:id="rId18"/>
   </p:handoutMasterIdLst>
   <p:sldIdLst>
     <p:sldId id="409" r:id="rId7"/>
@@ -18,12 +18,11 @@
     <p:sldId id="388" r:id="rId9"/>
     <p:sldId id="420" r:id="rId10"/>
     <p:sldId id="407" r:id="rId11"/>
-    <p:sldId id="421" r:id="rId12"/>
-    <p:sldId id="427" r:id="rId13"/>
-    <p:sldId id="422" r:id="rId14"/>
-    <p:sldId id="423" r:id="rId15"/>
-    <p:sldId id="424" r:id="rId16"/>
-    <p:sldId id="426" r:id="rId17"/>
+    <p:sldId id="427" r:id="rId12"/>
+    <p:sldId id="422" r:id="rId13"/>
+    <p:sldId id="423" r:id="rId14"/>
+    <p:sldId id="424" r:id="rId15"/>
+    <p:sldId id="426" r:id="rId16"/>
   </p:sldIdLst>
   <p:sldSz cx="12192000" cy="6858000"/>
   <p:notesSz cx="6858000" cy="9144000"/>
@@ -219,7 +218,7 @@
           <a:p>
             <a:fld id="{312E7B4A-039C-48A2-9B2C-AF16AA3873D8}" type="datetimeFigureOut">
               <a:rPr lang="en-US" smtClean="0"/>
-              <a:t>10/12/2017</a:t>
+              <a:t>11/26/2017</a:t>
             </a:fld>
             <a:endParaRPr lang="en-US"/>
           </a:p>
@@ -384,7 +383,7 @@
           <a:p>
             <a:fld id="{DA005A0C-54D9-45AA-87D4-C551D08DFCE1}" type="datetimeFigureOut">
               <a:rPr lang="en-US" smtClean="0"/>
-              <a:t>10/12/2017</a:t>
+              <a:t>11/26/2017</a:t>
             </a:fld>
             <a:endParaRPr lang="en-US"/>
           </a:p>
@@ -809,90 +808,6 @@
     </p:spTree>
     <p:extLst>
       <p:ext uri="{BB962C8B-B14F-4D97-AF65-F5344CB8AC3E}">
-        <p14:creationId xmlns:p14="http://schemas.microsoft.com/office/powerpoint/2010/main" val="3448908369"/>
-      </p:ext>
-    </p:extLst>
-  </p:cSld>
-  <p:clrMapOvr>
-    <a:masterClrMapping/>
-  </p:clrMapOvr>
-</p:notes>
-</file>
-
-<file path=ppt/notesSlides/notesSlide11.xml><?xml version="1.0" encoding="utf-8"?>
-<p:notes xmlns:a="http://schemas.openxmlformats.org/drawingml/2006/main" xmlns:r="http://schemas.openxmlformats.org/officeDocument/2006/relationships" xmlns:p="http://schemas.openxmlformats.org/presentationml/2006/main">
-  <p:cSld>
-    <p:spTree>
-      <p:nvGrpSpPr>
-        <p:cNvPr id="1" name=""/>
-        <p:cNvGrpSpPr/>
-        <p:nvPr/>
-      </p:nvGrpSpPr>
-      <p:grpSpPr>
-        <a:xfrm>
-          <a:off x="0" y="0"/>
-          <a:ext cx="0" cy="0"/>
-          <a:chOff x="0" y="0"/>
-          <a:chExt cx="0" cy="0"/>
-        </a:xfrm>
-      </p:grpSpPr>
-      <p:sp>
-        <p:nvSpPr>
-          <p:cNvPr id="2" name="Slide Image Placeholder 1"/>
-          <p:cNvSpPr>
-            <a:spLocks noGrp="1" noRot="1" noChangeAspect="1"/>
-          </p:cNvSpPr>
-          <p:nvPr>
-            <p:ph type="sldImg"/>
-          </p:nvPr>
-        </p:nvSpPr>
-        <p:spPr/>
-      </p:sp>
-      <p:sp>
-        <p:nvSpPr>
-          <p:cNvPr id="3" name="Notes Placeholder 2"/>
-          <p:cNvSpPr>
-            <a:spLocks noGrp="1"/>
-          </p:cNvSpPr>
-          <p:nvPr>
-            <p:ph type="body" idx="1"/>
-          </p:nvPr>
-        </p:nvSpPr>
-        <p:spPr/>
-        <p:txBody>
-          <a:bodyPr/>
-          <a:lstStyle/>
-          <a:p>
-            <a:endParaRPr lang="en-IN" dirty="0"/>
-          </a:p>
-        </p:txBody>
-      </p:sp>
-      <p:sp>
-        <p:nvSpPr>
-          <p:cNvPr id="4" name="Slide Number Placeholder 3"/>
-          <p:cNvSpPr>
-            <a:spLocks noGrp="1"/>
-          </p:cNvSpPr>
-          <p:nvPr>
-            <p:ph type="sldNum" sz="quarter" idx="10"/>
-          </p:nvPr>
-        </p:nvSpPr>
-        <p:spPr/>
-        <p:txBody>
-          <a:bodyPr/>
-          <a:lstStyle/>
-          <a:p>
-            <a:fld id="{4CFD207A-07DF-40AD-A916-9872E089CE7A}" type="slidenum">
-              <a:rPr lang="en-US" smtClean="0"/>
-              <a:t>11</a:t>
-            </a:fld>
-            <a:endParaRPr lang="en-US"/>
-          </a:p>
-        </p:txBody>
-      </p:sp>
-    </p:spTree>
-    <p:extLst>
-      <p:ext uri="{BB962C8B-B14F-4D97-AF65-F5344CB8AC3E}">
         <p14:creationId xmlns:p14="http://schemas.microsoft.com/office/powerpoint/2010/main" val="2710872585"/>
       </p:ext>
     </p:extLst>
@@ -1353,7 +1268,246 @@
           <a:bodyPr/>
           <a:lstStyle/>
           <a:p>
-            <a:endParaRPr lang="en-IN" dirty="0"/>
+            <a:r>
+              <a:rPr lang="en-IN" sz="1200" b="1" i="0" u="none" strike="noStrike" kern="1200" dirty="0">
+                <a:solidFill>
+                  <a:schemeClr val="tx1"/>
+                </a:solidFill>
+                <a:effectLst/>
+                <a:latin typeface="+mn-lt"/>
+                <a:ea typeface="+mn-ea"/>
+                <a:cs typeface="+mn-cs"/>
+              </a:rPr>
+              <a:t>Theme</a:t>
+            </a:r>
+            <a:r>
+              <a:rPr lang="en-IN" dirty="0"/>
+              <a:t> </a:t>
+            </a:r>
+            <a:r>
+              <a:rPr lang="en-IN" sz="1200" b="1" i="0" u="none" strike="noStrike" kern="1200" dirty="0">
+                <a:solidFill>
+                  <a:schemeClr val="tx1"/>
+                </a:solidFill>
+                <a:effectLst/>
+                <a:latin typeface="+mn-lt"/>
+                <a:ea typeface="+mn-ea"/>
+                <a:cs typeface="+mn-cs"/>
+              </a:rPr>
+              <a:t>What it covers</a:t>
+            </a:r>
+            <a:r>
+              <a:rPr lang="en-IN" dirty="0"/>
+              <a:t> </a:t>
+            </a:r>
+            <a:r>
+              <a:rPr lang="en-IN" sz="1200" b="0" i="0" u="none" strike="noStrike" kern="1200" dirty="0">
+                <a:solidFill>
+                  <a:schemeClr val="tx1"/>
+                </a:solidFill>
+                <a:effectLst/>
+                <a:latin typeface="+mn-lt"/>
+                <a:ea typeface="+mn-ea"/>
+                <a:cs typeface="+mn-cs"/>
+              </a:rPr>
+              <a:t>Digital India</a:t>
+            </a:r>
+            <a:r>
+              <a:rPr lang="en-IN" dirty="0"/>
+              <a:t> </a:t>
+            </a:r>
+            <a:r>
+              <a:rPr lang="en-IN" sz="1200" b="0" i="0" u="none" strike="noStrike" kern="1200" dirty="0">
+                <a:solidFill>
+                  <a:schemeClr val="tx1"/>
+                </a:solidFill>
+                <a:effectLst/>
+                <a:latin typeface="+mn-lt"/>
+                <a:ea typeface="+mn-ea"/>
+                <a:cs typeface="+mn-cs"/>
+              </a:rPr>
+              <a:t>Use technology to help solve some of the major </a:t>
+            </a:r>
+            <a:r>
+              <a:rPr lang="en-IN" sz="1200" b="0" i="0" u="none" strike="sngStrike" kern="1200" dirty="0">
+                <a:solidFill>
+                  <a:schemeClr val="tx1"/>
+                </a:solidFill>
+                <a:effectLst/>
+                <a:latin typeface="+mn-lt"/>
+                <a:ea typeface="+mn-ea"/>
+                <a:cs typeface="+mn-cs"/>
+              </a:rPr>
+              <a:t>se</a:t>
+            </a:r>
+            <a:r>
+              <a:rPr lang="en-IN" sz="1200" b="0" i="0" u="none" strike="noStrike" kern="1200" dirty="0">
+                <a:solidFill>
+                  <a:schemeClr val="tx1"/>
+                </a:solidFill>
+                <a:effectLst/>
+                <a:latin typeface="+mn-lt"/>
+                <a:ea typeface="+mn-ea"/>
+                <a:cs typeface="+mn-cs"/>
+              </a:rPr>
+              <a:t>ctoral issues in agriculture, education, skilling, urban development, payment infrastructure etc.</a:t>
+            </a:r>
+            <a:r>
+              <a:rPr lang="en-IN" dirty="0"/>
+              <a:t> </a:t>
+            </a:r>
+            <a:r>
+              <a:rPr lang="en-IN" sz="1200" b="0" i="0" u="none" strike="noStrike" kern="1200" dirty="0">
+                <a:solidFill>
+                  <a:schemeClr val="tx1"/>
+                </a:solidFill>
+                <a:effectLst/>
+                <a:latin typeface="+mn-lt"/>
+                <a:ea typeface="+mn-ea"/>
+                <a:cs typeface="+mn-cs"/>
+              </a:rPr>
+              <a:t>Hack for Good</a:t>
+            </a:r>
+            <a:r>
+              <a:rPr lang="en-IN" dirty="0"/>
+              <a:t> </a:t>
+            </a:r>
+            <a:r>
+              <a:rPr lang="en-IN" sz="1200" b="0" i="0" u="none" strike="noStrike" kern="1200" dirty="0">
+                <a:solidFill>
+                  <a:schemeClr val="tx1"/>
+                </a:solidFill>
+                <a:effectLst/>
+                <a:latin typeface="+mn-lt"/>
+                <a:ea typeface="+mn-ea"/>
+                <a:cs typeface="+mn-cs"/>
+              </a:rPr>
+              <a:t>Technology is an enabler, a creator of innovative and scalable solutions that can mitigate social problems. Choose a social cause close to your heart--it could be anything from literacy, child rights, </a:t>
+            </a:r>
+            <a:r>
+              <a:rPr lang="en-IN" sz="1200" b="0" i="0" u="none" strike="noStrike" kern="1200" dirty="0" err="1">
+                <a:solidFill>
+                  <a:schemeClr val="tx1"/>
+                </a:solidFill>
+                <a:effectLst/>
+                <a:latin typeface="+mn-lt"/>
+                <a:ea typeface="+mn-ea"/>
+                <a:cs typeface="+mn-cs"/>
+              </a:rPr>
+              <a:t>heathcare</a:t>
+            </a:r>
+            <a:r>
+              <a:rPr lang="en-IN" sz="1200" b="0" i="0" u="none" strike="noStrike" kern="1200" dirty="0">
+                <a:solidFill>
+                  <a:schemeClr val="tx1"/>
+                </a:solidFill>
+                <a:effectLst/>
+                <a:latin typeface="+mn-lt"/>
+                <a:ea typeface="+mn-ea"/>
+                <a:cs typeface="+mn-cs"/>
+              </a:rPr>
+              <a:t>, accessibility, animal rights, etc--and show us how technology boost solutions for social good.  </a:t>
+            </a:r>
+            <a:r>
+              <a:rPr lang="en-IN" dirty="0"/>
+              <a:t> </a:t>
+            </a:r>
+            <a:r>
+              <a:rPr lang="en-IN" sz="1200" b="0" i="0" u="none" strike="noStrike" kern="1200" dirty="0">
+                <a:solidFill>
+                  <a:schemeClr val="tx1"/>
+                </a:solidFill>
+                <a:effectLst/>
+                <a:latin typeface="+mn-lt"/>
+                <a:ea typeface="+mn-ea"/>
+                <a:cs typeface="+mn-cs"/>
+              </a:rPr>
+              <a:t>Save our Planet</a:t>
+            </a:r>
+            <a:r>
+              <a:rPr lang="en-IN" dirty="0"/>
+              <a:t> </a:t>
+            </a:r>
+            <a:r>
+              <a:rPr lang="en-IN" sz="1200" b="0" i="0" u="none" strike="noStrike" kern="1200" dirty="0">
+                <a:solidFill>
+                  <a:schemeClr val="tx1"/>
+                </a:solidFill>
+                <a:effectLst/>
+                <a:latin typeface="+mn-lt"/>
+                <a:ea typeface="+mn-ea"/>
+                <a:cs typeface="+mn-cs"/>
+              </a:rPr>
+              <a:t>There is general consensus among people and the scientific community that human beings are seriously damaging our planet to the point that all life on Earth is now threatened with extinction through the over-exploitation of the earth's resources, human caused climate change, destruction of habitats, and the pollution of the land, air and waters of our planet. If this bothers you, pick a topic and show us how technology can be used to solve problems around it. The topic could be anything---reduce carbon footprint, save our rivers, save our trees, global warming, etc</a:t>
+            </a:r>
+            <a:r>
+              <a:rPr lang="en-IN" dirty="0"/>
+              <a:t> </a:t>
+            </a:r>
+            <a:r>
+              <a:rPr lang="en-IN" sz="1200" b="0" i="0" u="none" strike="noStrike" kern="1200" dirty="0">
+                <a:solidFill>
+                  <a:schemeClr val="tx1"/>
+                </a:solidFill>
+                <a:effectLst/>
+                <a:latin typeface="+mn-lt"/>
+                <a:ea typeface="+mn-ea"/>
+                <a:cs typeface="+mn-cs"/>
+              </a:rPr>
+              <a:t>Productivity</a:t>
+            </a:r>
+            <a:r>
+              <a:rPr lang="en-IN" dirty="0"/>
+              <a:t> </a:t>
+            </a:r>
+            <a:r>
+              <a:rPr lang="en-IN" sz="1200" b="0" i="0" u="none" strike="noStrike" kern="1200" dirty="0">
+                <a:solidFill>
+                  <a:schemeClr val="tx1"/>
+                </a:solidFill>
+                <a:effectLst/>
+                <a:latin typeface="+mn-lt"/>
+                <a:ea typeface="+mn-ea"/>
+                <a:cs typeface="+mn-cs"/>
+              </a:rPr>
+              <a:t>We live in a world where technology is omnipresent in our lives. Whether you are a student, a home maker, a professional, a teacher, a large enterprise or an SMB---technology empowers you and enables you to do more--better, faster. If the power of technology to reinvent productivity excites you, pick this theme. Choose any persona of your choice and show us how you can use technology to improve their lives. </a:t>
+            </a:r>
+            <a:r>
+              <a:rPr lang="en-IN" dirty="0"/>
+              <a:t> </a:t>
+            </a:r>
+            <a:r>
+              <a:rPr lang="en-IN" sz="1200" b="0" i="0" u="none" strike="noStrike" kern="1200" dirty="0">
+                <a:solidFill>
+                  <a:schemeClr val="tx1"/>
+                </a:solidFill>
+                <a:effectLst/>
+                <a:latin typeface="+mn-lt"/>
+                <a:ea typeface="+mn-ea"/>
+                <a:cs typeface="+mn-cs"/>
+              </a:rPr>
+              <a:t>Entertainment</a:t>
+            </a:r>
+            <a:r>
+              <a:rPr lang="en-IN" dirty="0"/>
+              <a:t> </a:t>
+            </a:r>
+            <a:r>
+              <a:rPr lang="en-IN" sz="1200" b="0" i="0" u="none" strike="noStrike" kern="1200" dirty="0">
+                <a:solidFill>
+                  <a:schemeClr val="tx1"/>
+                </a:solidFill>
+                <a:effectLst/>
+                <a:latin typeface="+mn-lt"/>
+                <a:ea typeface="+mn-ea"/>
+                <a:cs typeface="+mn-cs"/>
+              </a:rPr>
+              <a:t>The world of entertainment has undergone an incredible change in the last decade. Seismic shifts in technology have allowed numerous disruptors to enter the market. Gone are the days when gaming would mean playing video games solo or a family entertainment outing would mean a visit to the  local cinema hall.  Our entertainment experiences now live along a time-line from their first planning to their happening to their broadcast, often simultaneously with the experience, and then well beyond as they’re shared and permanently archived, all made possible by technology. People today are seeing more value in doing things and sharing those experiences. Many people are  perpetually connected via the Internet and smart phones. Experiences have now become a powerful vehicle for social expression, entertainment and conversation. If this world excites you, show us how you can use technology to make it even more exciting</a:t>
+            </a:r>
+            <a:r>
+              <a:rPr lang="en-IN" dirty="0"/>
+              <a:t> </a:t>
+            </a:r>
           </a:p>
         </p:txBody>
       </p:sp>
@@ -1383,7 +1537,7 @@
     </p:spTree>
     <p:extLst>
       <p:ext uri="{BB962C8B-B14F-4D97-AF65-F5344CB8AC3E}">
-        <p14:creationId xmlns:p14="http://schemas.microsoft.com/office/powerpoint/2010/main" val="2542914890"/>
+        <p14:creationId xmlns:p14="http://schemas.microsoft.com/office/powerpoint/2010/main" val="3963030282"/>
       </p:ext>
     </p:extLst>
   </p:cSld>
@@ -1437,246 +1591,7 @@
           <a:bodyPr/>
           <a:lstStyle/>
           <a:p>
-            <a:r>
-              <a:rPr lang="en-IN" sz="1200" b="1" i="0" u="none" strike="noStrike" kern="1200" dirty="0">
-                <a:solidFill>
-                  <a:schemeClr val="tx1"/>
-                </a:solidFill>
-                <a:effectLst/>
-                <a:latin typeface="+mn-lt"/>
-                <a:ea typeface="+mn-ea"/>
-                <a:cs typeface="+mn-cs"/>
-              </a:rPr>
-              <a:t>Theme</a:t>
-            </a:r>
-            <a:r>
-              <a:rPr lang="en-IN" dirty="0"/>
-              <a:t> </a:t>
-            </a:r>
-            <a:r>
-              <a:rPr lang="en-IN" sz="1200" b="1" i="0" u="none" strike="noStrike" kern="1200" dirty="0">
-                <a:solidFill>
-                  <a:schemeClr val="tx1"/>
-                </a:solidFill>
-                <a:effectLst/>
-                <a:latin typeface="+mn-lt"/>
-                <a:ea typeface="+mn-ea"/>
-                <a:cs typeface="+mn-cs"/>
-              </a:rPr>
-              <a:t>What it covers</a:t>
-            </a:r>
-            <a:r>
-              <a:rPr lang="en-IN" dirty="0"/>
-              <a:t> </a:t>
-            </a:r>
-            <a:r>
-              <a:rPr lang="en-IN" sz="1200" b="0" i="0" u="none" strike="noStrike" kern="1200" dirty="0">
-                <a:solidFill>
-                  <a:schemeClr val="tx1"/>
-                </a:solidFill>
-                <a:effectLst/>
-                <a:latin typeface="+mn-lt"/>
-                <a:ea typeface="+mn-ea"/>
-                <a:cs typeface="+mn-cs"/>
-              </a:rPr>
-              <a:t>Digital India</a:t>
-            </a:r>
-            <a:r>
-              <a:rPr lang="en-IN" dirty="0"/>
-              <a:t> </a:t>
-            </a:r>
-            <a:r>
-              <a:rPr lang="en-IN" sz="1200" b="0" i="0" u="none" strike="noStrike" kern="1200" dirty="0">
-                <a:solidFill>
-                  <a:schemeClr val="tx1"/>
-                </a:solidFill>
-                <a:effectLst/>
-                <a:latin typeface="+mn-lt"/>
-                <a:ea typeface="+mn-ea"/>
-                <a:cs typeface="+mn-cs"/>
-              </a:rPr>
-              <a:t>Use technology to help solve some of the major </a:t>
-            </a:r>
-            <a:r>
-              <a:rPr lang="en-IN" sz="1200" b="0" i="0" u="none" strike="sngStrike" kern="1200" dirty="0">
-                <a:solidFill>
-                  <a:schemeClr val="tx1"/>
-                </a:solidFill>
-                <a:effectLst/>
-                <a:latin typeface="+mn-lt"/>
-                <a:ea typeface="+mn-ea"/>
-                <a:cs typeface="+mn-cs"/>
-              </a:rPr>
-              <a:t>se</a:t>
-            </a:r>
-            <a:r>
-              <a:rPr lang="en-IN" sz="1200" b="0" i="0" u="none" strike="noStrike" kern="1200" dirty="0">
-                <a:solidFill>
-                  <a:schemeClr val="tx1"/>
-                </a:solidFill>
-                <a:effectLst/>
-                <a:latin typeface="+mn-lt"/>
-                <a:ea typeface="+mn-ea"/>
-                <a:cs typeface="+mn-cs"/>
-              </a:rPr>
-              <a:t>ctoral issues in agriculture, education, skilling, urban development, payment infrastructure etc.</a:t>
-            </a:r>
-            <a:r>
-              <a:rPr lang="en-IN" dirty="0"/>
-              <a:t> </a:t>
-            </a:r>
-            <a:r>
-              <a:rPr lang="en-IN" sz="1200" b="0" i="0" u="none" strike="noStrike" kern="1200" dirty="0">
-                <a:solidFill>
-                  <a:schemeClr val="tx1"/>
-                </a:solidFill>
-                <a:effectLst/>
-                <a:latin typeface="+mn-lt"/>
-                <a:ea typeface="+mn-ea"/>
-                <a:cs typeface="+mn-cs"/>
-              </a:rPr>
-              <a:t>Hack for Good</a:t>
-            </a:r>
-            <a:r>
-              <a:rPr lang="en-IN" dirty="0"/>
-              <a:t> </a:t>
-            </a:r>
-            <a:r>
-              <a:rPr lang="en-IN" sz="1200" b="0" i="0" u="none" strike="noStrike" kern="1200" dirty="0">
-                <a:solidFill>
-                  <a:schemeClr val="tx1"/>
-                </a:solidFill>
-                <a:effectLst/>
-                <a:latin typeface="+mn-lt"/>
-                <a:ea typeface="+mn-ea"/>
-                <a:cs typeface="+mn-cs"/>
-              </a:rPr>
-              <a:t>Technology is an enabler, a creator of innovative and scalable solutions that can mitigate social problems. Choose a social cause close to your heart--it could be anything from literacy, child rights, </a:t>
-            </a:r>
-            <a:r>
-              <a:rPr lang="en-IN" sz="1200" b="0" i="0" u="none" strike="noStrike" kern="1200" dirty="0" err="1">
-                <a:solidFill>
-                  <a:schemeClr val="tx1"/>
-                </a:solidFill>
-                <a:effectLst/>
-                <a:latin typeface="+mn-lt"/>
-                <a:ea typeface="+mn-ea"/>
-                <a:cs typeface="+mn-cs"/>
-              </a:rPr>
-              <a:t>heathcare</a:t>
-            </a:r>
-            <a:r>
-              <a:rPr lang="en-IN" sz="1200" b="0" i="0" u="none" strike="noStrike" kern="1200" dirty="0">
-                <a:solidFill>
-                  <a:schemeClr val="tx1"/>
-                </a:solidFill>
-                <a:effectLst/>
-                <a:latin typeface="+mn-lt"/>
-                <a:ea typeface="+mn-ea"/>
-                <a:cs typeface="+mn-cs"/>
-              </a:rPr>
-              <a:t>, accessibility, animal rights, etc--and show us how technology boost solutions for social good.  </a:t>
-            </a:r>
-            <a:r>
-              <a:rPr lang="en-IN" dirty="0"/>
-              <a:t> </a:t>
-            </a:r>
-            <a:r>
-              <a:rPr lang="en-IN" sz="1200" b="0" i="0" u="none" strike="noStrike" kern="1200" dirty="0">
-                <a:solidFill>
-                  <a:schemeClr val="tx1"/>
-                </a:solidFill>
-                <a:effectLst/>
-                <a:latin typeface="+mn-lt"/>
-                <a:ea typeface="+mn-ea"/>
-                <a:cs typeface="+mn-cs"/>
-              </a:rPr>
-              <a:t>Save our Planet</a:t>
-            </a:r>
-            <a:r>
-              <a:rPr lang="en-IN" dirty="0"/>
-              <a:t> </a:t>
-            </a:r>
-            <a:r>
-              <a:rPr lang="en-IN" sz="1200" b="0" i="0" u="none" strike="noStrike" kern="1200" dirty="0">
-                <a:solidFill>
-                  <a:schemeClr val="tx1"/>
-                </a:solidFill>
-                <a:effectLst/>
-                <a:latin typeface="+mn-lt"/>
-                <a:ea typeface="+mn-ea"/>
-                <a:cs typeface="+mn-cs"/>
-              </a:rPr>
-              <a:t>There is general consensus among people and the scientific community that human beings are seriously damaging our planet to the point that all life on Earth is now threatened with extinction through the over-exploitation of the earth's resources, human caused climate change, destruction of habitats, and the pollution of the land, air and waters of our planet. If this bothers you, pick a topic and show us how technology can be used to solve problems around it. The topic could be anything---reduce carbon footprint, save our rivers, save our trees, global warming, etc</a:t>
-            </a:r>
-            <a:r>
-              <a:rPr lang="en-IN" dirty="0"/>
-              <a:t> </a:t>
-            </a:r>
-            <a:r>
-              <a:rPr lang="en-IN" sz="1200" b="0" i="0" u="none" strike="noStrike" kern="1200" dirty="0">
-                <a:solidFill>
-                  <a:schemeClr val="tx1"/>
-                </a:solidFill>
-                <a:effectLst/>
-                <a:latin typeface="+mn-lt"/>
-                <a:ea typeface="+mn-ea"/>
-                <a:cs typeface="+mn-cs"/>
-              </a:rPr>
-              <a:t>Productivity</a:t>
-            </a:r>
-            <a:r>
-              <a:rPr lang="en-IN" dirty="0"/>
-              <a:t> </a:t>
-            </a:r>
-            <a:r>
-              <a:rPr lang="en-IN" sz="1200" b="0" i="0" u="none" strike="noStrike" kern="1200" dirty="0">
-                <a:solidFill>
-                  <a:schemeClr val="tx1"/>
-                </a:solidFill>
-                <a:effectLst/>
-                <a:latin typeface="+mn-lt"/>
-                <a:ea typeface="+mn-ea"/>
-                <a:cs typeface="+mn-cs"/>
-              </a:rPr>
-              <a:t>We live in a world where technology is omnipresent in our lives. Whether you are a student, a home maker, a professional, a teacher, a large enterprise or an SMB---technology empowers you and enables you to do more--better, faster. If the power of technology to reinvent productivity excites you, pick this theme. Choose any persona of your choice and show us how you can use technology to improve their lives. </a:t>
-            </a:r>
-            <a:r>
-              <a:rPr lang="en-IN" dirty="0"/>
-              <a:t> </a:t>
-            </a:r>
-            <a:r>
-              <a:rPr lang="en-IN" sz="1200" b="0" i="0" u="none" strike="noStrike" kern="1200" dirty="0">
-                <a:solidFill>
-                  <a:schemeClr val="tx1"/>
-                </a:solidFill>
-                <a:effectLst/>
-                <a:latin typeface="+mn-lt"/>
-                <a:ea typeface="+mn-ea"/>
-                <a:cs typeface="+mn-cs"/>
-              </a:rPr>
-              <a:t>Entertainment</a:t>
-            </a:r>
-            <a:r>
-              <a:rPr lang="en-IN" dirty="0"/>
-              <a:t> </a:t>
-            </a:r>
-            <a:r>
-              <a:rPr lang="en-IN" sz="1200" b="0" i="0" u="none" strike="noStrike" kern="1200" dirty="0">
-                <a:solidFill>
-                  <a:schemeClr val="tx1"/>
-                </a:solidFill>
-                <a:effectLst/>
-                <a:latin typeface="+mn-lt"/>
-                <a:ea typeface="+mn-ea"/>
-                <a:cs typeface="+mn-cs"/>
-              </a:rPr>
-              <a:t>The world of entertainment has undergone an incredible change in the last decade. Seismic shifts in technology have allowed numerous disruptors to enter the market. Gone are the days when gaming would mean playing video games solo or a family entertainment outing would mean a visit to the  local cinema hall.  Our entertainment experiences now live along a time-line from their first planning to their happening to their broadcast, often simultaneously with the experience, and then well beyond as they’re shared and permanently archived, all made possible by technology. People today are seeing more value in doing things and sharing those experiences. Many people are  perpetually connected via the Internet and smart phones. Experiences have now become a powerful vehicle for social expression, entertainment and conversation. If this world excites you, show us how you can use technology to make it even more exciting</a:t>
-            </a:r>
-            <a:r>
-              <a:rPr lang="en-IN" dirty="0"/>
-              <a:t> </a:t>
-            </a:r>
+            <a:endParaRPr lang="en-IN" dirty="0"/>
           </a:p>
         </p:txBody>
       </p:sp>
@@ -1706,7 +1621,7 @@
     </p:spTree>
     <p:extLst>
       <p:ext uri="{BB962C8B-B14F-4D97-AF65-F5344CB8AC3E}">
-        <p14:creationId xmlns:p14="http://schemas.microsoft.com/office/powerpoint/2010/main" val="3963030282"/>
+        <p14:creationId xmlns:p14="http://schemas.microsoft.com/office/powerpoint/2010/main" val="2771644069"/>
       </p:ext>
     </p:extLst>
   </p:cSld>
@@ -1790,7 +1705,7 @@
     </p:spTree>
     <p:extLst>
       <p:ext uri="{BB962C8B-B14F-4D97-AF65-F5344CB8AC3E}">
-        <p14:creationId xmlns:p14="http://schemas.microsoft.com/office/powerpoint/2010/main" val="2771644069"/>
+        <p14:creationId xmlns:p14="http://schemas.microsoft.com/office/powerpoint/2010/main" val="3008994867"/>
       </p:ext>
     </p:extLst>
   </p:cSld>
@@ -1874,7 +1789,7 @@
     </p:spTree>
     <p:extLst>
       <p:ext uri="{BB962C8B-B14F-4D97-AF65-F5344CB8AC3E}">
-        <p14:creationId xmlns:p14="http://schemas.microsoft.com/office/powerpoint/2010/main" val="3008994867"/>
+        <p14:creationId xmlns:p14="http://schemas.microsoft.com/office/powerpoint/2010/main" val="3448908369"/>
       </p:ext>
     </p:extLst>
   </p:cSld>
@@ -23064,7 +22979,7 @@
           <p:cNvPr id="4" name="Picture 3">
             <a:extLst>
               <a:ext uri="{FF2B5EF4-FFF2-40B4-BE49-F238E27FC236}">
-                <a16:creationId xmlns:a16="http://schemas.microsoft.com/office/drawing/2014/main" id="{CEA7C1F1-6C5C-4A57-A566-7BFDFE5EB3B9}"/>
+                <a16:creationId xmlns:a16="http://schemas.microsoft.com/office/drawing/2014/main" id="{7F03C8A2-3AB2-45F5-95F0-2A8FBCA25855}"/>
               </a:ext>
             </a:extLst>
           </p:cNvPr>
@@ -23081,8 +22996,38 @@
         </p:blipFill>
         <p:spPr>
           <a:xfrm>
-            <a:off x="8592840" y="4839822"/>
-            <a:ext cx="2797352" cy="1595365"/>
+            <a:off x="8862729" y="4586359"/>
+            <a:ext cx="2646264" cy="2261353"/>
+          </a:xfrm>
+          <a:prstGeom prst="rect">
+            <a:avLst/>
+          </a:prstGeom>
+        </p:spPr>
+      </p:pic>
+      <p:pic>
+        <p:nvPicPr>
+          <p:cNvPr id="7" name="Picture 6">
+            <a:extLst>
+              <a:ext uri="{FF2B5EF4-FFF2-40B4-BE49-F238E27FC236}">
+                <a16:creationId xmlns:a16="http://schemas.microsoft.com/office/drawing/2014/main" id="{1E8691DC-5512-482A-B6F2-97129A442591}"/>
+              </a:ext>
+            </a:extLst>
+          </p:cNvPr>
+          <p:cNvPicPr>
+            <a:picLocks noChangeAspect="1"/>
+          </p:cNvPicPr>
+          <p:nvPr/>
+        </p:nvPicPr>
+        <p:blipFill>
+          <a:blip r:embed="rId6"/>
+          <a:stretch>
+            <a:fillRect/>
+          </a:stretch>
+        </p:blipFill>
+        <p:spPr>
+          <a:xfrm>
+            <a:off x="157163" y="5556567"/>
+            <a:ext cx="8605838" cy="668668"/>
           </a:xfrm>
           <a:prstGeom prst="rect">
             <a:avLst/>
@@ -23103,205 +23048,6 @@
 </file>
 
 <file path=ppt/slides/slide10.xml><?xml version="1.0" encoding="utf-8"?>
-<p:sld xmlns:a="http://schemas.openxmlformats.org/drawingml/2006/main" xmlns:r="http://schemas.openxmlformats.org/officeDocument/2006/relationships" xmlns:p="http://schemas.openxmlformats.org/presentationml/2006/main">
-  <p:cSld>
-    <p:spTree>
-      <p:nvGrpSpPr>
-        <p:cNvPr id="1" name=""/>
-        <p:cNvGrpSpPr/>
-        <p:nvPr/>
-      </p:nvGrpSpPr>
-      <p:grpSpPr>
-        <a:xfrm>
-          <a:off x="0" y="0"/>
-          <a:ext cx="0" cy="0"/>
-          <a:chOff x="0" y="0"/>
-          <a:chExt cx="0" cy="0"/>
-        </a:xfrm>
-      </p:grpSpPr>
-      <p:sp>
-        <p:nvSpPr>
-          <p:cNvPr id="4" name="Title 3"/>
-          <p:cNvSpPr>
-            <a:spLocks noGrp="1"/>
-          </p:cNvSpPr>
-          <p:nvPr>
-            <p:ph type="title"/>
-          </p:nvPr>
-        </p:nvSpPr>
-        <p:spPr/>
-        <p:txBody>
-          <a:bodyPr/>
-          <a:lstStyle/>
-          <a:p>
-            <a:r>
-              <a:rPr lang="en-IN" dirty="0"/>
-              <a:t>code.fun.do Hackathon</a:t>
-            </a:r>
-          </a:p>
-        </p:txBody>
-      </p:sp>
-      <p:pic>
-        <p:nvPicPr>
-          <p:cNvPr id="5" name="Picture 4"/>
-          <p:cNvPicPr>
-            <a:picLocks noChangeAspect="1"/>
-          </p:cNvPicPr>
-          <p:nvPr/>
-        </p:nvPicPr>
-        <p:blipFill>
-          <a:blip r:embed="rId3">
-            <a:extLst>
-              <a:ext uri="{28A0092B-C50C-407E-A947-70E740481C1C}">
-                <a14:useLocalDpi xmlns:a14="http://schemas.microsoft.com/office/drawing/2010/main" val="0"/>
-              </a:ext>
-            </a:extLst>
-          </a:blip>
-          <a:stretch>
-            <a:fillRect/>
-          </a:stretch>
-        </p:blipFill>
-        <p:spPr>
-          <a:xfrm>
-            <a:off x="11024193" y="6471787"/>
-            <a:ext cx="1047135" cy="222517"/>
-          </a:xfrm>
-          <a:prstGeom prst="rect">
-            <a:avLst/>
-          </a:prstGeom>
-        </p:spPr>
-      </p:pic>
-      <p:sp>
-        <p:nvSpPr>
-          <p:cNvPr id="6" name="Content Placeholder 5"/>
-          <p:cNvSpPr>
-            <a:spLocks noGrp="1"/>
-          </p:cNvSpPr>
-          <p:nvPr>
-            <p:ph sz="half" idx="2"/>
-          </p:nvPr>
-        </p:nvSpPr>
-        <p:spPr>
-          <a:xfrm>
-            <a:off x="379511" y="1371601"/>
-            <a:ext cx="11283402" cy="4953001"/>
-          </a:xfrm>
-        </p:spPr>
-        <p:txBody>
-          <a:bodyPr>
-            <a:normAutofit fontScale="92500" lnSpcReduction="20000"/>
-          </a:bodyPr>
-          <a:lstStyle/>
-          <a:p>
-            <a:r>
-              <a:rPr lang="en-IN" dirty="0"/>
-              <a:t>Post Event</a:t>
-            </a:r>
-          </a:p>
-          <a:p>
-            <a:pPr lvl="1"/>
-            <a:r>
-              <a:rPr lang="en-IN" dirty="0"/>
-              <a:t>Submissions</a:t>
-            </a:r>
-          </a:p>
-          <a:p>
-            <a:pPr lvl="2"/>
-            <a:r>
-              <a:rPr lang="en-IN" dirty="0"/>
-              <a:t>Teams to submit their app online along with a 3min demo video</a:t>
-            </a:r>
-          </a:p>
-          <a:p>
-            <a:pPr lvl="3"/>
-            <a:r>
-              <a:rPr lang="en-US" sz="2100" dirty="0"/>
-              <a:t>Demo video should clearly highlight the functionality built in the app, along with known issues and bugs</a:t>
-            </a:r>
-          </a:p>
-          <a:p>
-            <a:pPr lvl="3"/>
-            <a:r>
-              <a:rPr lang="en-US" sz="2100" dirty="0"/>
-              <a:t>The apps should be deployable on targeted device. Include a Readme in the upload archive.</a:t>
-            </a:r>
-          </a:p>
-          <a:p>
-            <a:pPr lvl="3"/>
-            <a:r>
-              <a:rPr lang="en-US" sz="2100" dirty="0"/>
-              <a:t>Deadline – One Week from today.</a:t>
-            </a:r>
-          </a:p>
-          <a:p>
-            <a:pPr lvl="3"/>
-            <a:endParaRPr lang="en-IN" dirty="0"/>
-          </a:p>
-          <a:p>
-            <a:pPr lvl="2"/>
-            <a:r>
-              <a:rPr lang="en-US" dirty="0"/>
-              <a:t>Valid submissions will be judged by panel of Microsoft mentors</a:t>
-            </a:r>
-            <a:endParaRPr lang="en-IN" dirty="0"/>
-          </a:p>
-          <a:p>
-            <a:pPr lvl="2"/>
-            <a:endParaRPr lang="en-IN" dirty="0"/>
-          </a:p>
-          <a:p>
-            <a:pPr lvl="1"/>
-            <a:r>
-              <a:rPr lang="en-IN" dirty="0"/>
-              <a:t>Results –</a:t>
-            </a:r>
-          </a:p>
-          <a:p>
-            <a:pPr lvl="2"/>
-            <a:r>
-              <a:rPr lang="en-IN" dirty="0"/>
-              <a:t>Top teams (3) would qualify for on-campus code.fun.do with Seniors. </a:t>
-            </a:r>
-          </a:p>
-          <a:p>
-            <a:pPr lvl="2"/>
-            <a:r>
-              <a:rPr lang="en-US" dirty="0"/>
-              <a:t>T-shirt and Goodies to all successful submissions. Additional prizes for Top 3 teams.</a:t>
-            </a:r>
-          </a:p>
-          <a:p>
-            <a:pPr lvl="2"/>
-            <a:r>
-              <a:rPr lang="en-US" dirty="0"/>
-              <a:t>Chance to compete with Seniors and Win big in on-campus code.fun.do </a:t>
-            </a:r>
-            <a:endParaRPr lang="en-IN" dirty="0"/>
-          </a:p>
-          <a:p>
-            <a:pPr lvl="2"/>
-            <a:endParaRPr lang="en-IN" dirty="0"/>
-          </a:p>
-          <a:p>
-            <a:pPr lvl="1"/>
-            <a:endParaRPr lang="en-IN" dirty="0"/>
-          </a:p>
-        </p:txBody>
-      </p:sp>
-    </p:spTree>
-    <p:extLst>
-      <p:ext uri="{BB962C8B-B14F-4D97-AF65-F5344CB8AC3E}">
-        <p14:creationId xmlns:p14="http://schemas.microsoft.com/office/powerpoint/2010/main" val="701584294"/>
-      </p:ext>
-    </p:extLst>
-  </p:cSld>
-  <p:clrMapOvr>
-    <a:masterClrMapping/>
-  </p:clrMapOvr>
-</p:sld>
-</file>
-
-<file path=ppt/slides/slide11.xml><?xml version="1.0" encoding="utf-8"?>
 <p:sld xmlns:a="http://schemas.openxmlformats.org/drawingml/2006/main" xmlns:r="http://schemas.openxmlformats.org/officeDocument/2006/relationships" xmlns:p="http://schemas.openxmlformats.org/presentationml/2006/main">
   <p:cSld>
     <p:spTree>
@@ -23387,13 +23133,13 @@
           <a:p>
             <a:r>
               <a:rPr lang="en-IN" sz="2800" dirty="0"/>
-              <a:t>Code.fun.do Program introduction – 30min</a:t>
+              <a:t>Code.fun.do Program introduction </a:t>
             </a:r>
           </a:p>
           <a:p>
             <a:r>
               <a:rPr lang="en-IN" sz="2800" dirty="0"/>
-              <a:t>Technical Session – Pre-Dinner – 90min</a:t>
+              <a:t>Technical Session </a:t>
             </a:r>
           </a:p>
           <a:p>
@@ -23418,20 +23164,7 @@
             </a:r>
           </a:p>
           <a:p>
-            <a:r>
-              <a:rPr lang="en-IN" dirty="0"/>
-              <a:t>Dinner Break – 60min</a:t>
-            </a:r>
-          </a:p>
-          <a:p>
-            <a:pPr marL="514331" indent="-457200"/>
-            <a:r>
-              <a:rPr lang="en-IN" sz="2800" dirty="0"/>
-              <a:t>Technical Session – Post-Dinner – 120min</a:t>
-            </a:r>
-          </a:p>
-          <a:p>
-            <a:pPr marL="914246" lvl="1" indent="-457200"/>
+            <a:pPr lvl="1"/>
             <a:r>
               <a:rPr lang="en-IN" sz="2400" dirty="0"/>
               <a:t>Microsoft Cognitive Services</a:t>
@@ -23439,7 +23172,7 @@
             <a:endParaRPr lang="en-US" sz="2400" dirty="0"/>
           </a:p>
           <a:p>
-            <a:pPr marL="914246" lvl="1" indent="-457200"/>
+            <a:pPr lvl="1"/>
             <a:r>
               <a:rPr lang="en-US" sz="2400" dirty="0"/>
               <a:t>Bot Framework and Azure ML</a:t>
@@ -24121,127 +23854,7 @@
 </file>
 
 <file path=ppt/slides/slide6.xml><?xml version="1.0" encoding="utf-8"?>
-<p:sld xmlns:a="http://schemas.openxmlformats.org/drawingml/2006/main" xmlns:r="http://schemas.openxmlformats.org/officeDocument/2006/relationships" xmlns:p="http://schemas.openxmlformats.org/presentationml/2006/main" show="0">
-  <p:cSld>
-    <p:spTree>
-      <p:nvGrpSpPr>
-        <p:cNvPr id="1" name=""/>
-        <p:cNvGrpSpPr/>
-        <p:nvPr/>
-      </p:nvGrpSpPr>
-      <p:grpSpPr>
-        <a:xfrm>
-          <a:off x="0" y="0"/>
-          <a:ext cx="0" cy="0"/>
-          <a:chOff x="0" y="0"/>
-          <a:chExt cx="0" cy="0"/>
-        </a:xfrm>
-      </p:grpSpPr>
-      <p:sp>
-        <p:nvSpPr>
-          <p:cNvPr id="2" name="Text Placeholder 1"/>
-          <p:cNvSpPr>
-            <a:spLocks noGrp="1"/>
-          </p:cNvSpPr>
-          <p:nvPr>
-            <p:ph sz="half" idx="2"/>
-          </p:nvPr>
-        </p:nvSpPr>
-        <p:spPr>
-          <a:xfrm>
-            <a:off x="379511" y="1371601"/>
-            <a:ext cx="11071376" cy="4953001"/>
-          </a:xfrm>
-        </p:spPr>
-        <p:txBody>
-          <a:bodyPr>
-            <a:normAutofit fontScale="92500" lnSpcReduction="10000"/>
-          </a:bodyPr>
-          <a:lstStyle/>
-          <a:p>
-            <a:r>
-              <a:rPr lang="en-US" dirty="0"/>
-              <a:t>The Artist</a:t>
-            </a:r>
-            <a:endParaRPr lang="en-IN" dirty="0"/>
-          </a:p>
-          <a:p>
-            <a:pPr lvl="1"/>
-            <a:r>
-              <a:rPr lang="en-US" dirty="0"/>
-              <a:t>Art is essential to human society, get creative and generate Art via AI. Help your AI generate paintings, jokes, poems and so on. </a:t>
-            </a:r>
-            <a:endParaRPr lang="en-IN" dirty="0"/>
-          </a:p>
-          <a:p>
-            <a:r>
-              <a:rPr lang="en-US" dirty="0"/>
-              <a:t>Now you see me</a:t>
-            </a:r>
-            <a:endParaRPr lang="en-IN" dirty="0"/>
-          </a:p>
-          <a:p>
-            <a:pPr lvl="1"/>
-            <a:r>
-              <a:rPr lang="en-US" dirty="0"/>
-              <a:t>Help our bot start seeing things, which means that given an image input to the bot, what all can the bot see, and how it can respond. </a:t>
-            </a:r>
-            <a:endParaRPr lang="en-IN" dirty="0"/>
-          </a:p>
-          <a:p>
-            <a:r>
-              <a:rPr lang="en-US" dirty="0"/>
-              <a:t>The Social Network</a:t>
-            </a:r>
-            <a:endParaRPr lang="en-IN" dirty="0"/>
-          </a:p>
-          <a:p>
-            <a:pPr lvl="1"/>
-            <a:r>
-              <a:rPr lang="en-US" dirty="0"/>
-              <a:t>We all spend so much time on social networks! In this challenge, we want to see how our bot can enhance the same. Since our AI is a chat bot, develop chat based experiences which inherently encourages social interaction. These experiences can be games or puzzles or anything else. </a:t>
-            </a:r>
-            <a:endParaRPr lang="en-IN" dirty="0"/>
-          </a:p>
-        </p:txBody>
-      </p:sp>
-      <p:sp>
-        <p:nvSpPr>
-          <p:cNvPr id="3" name="Title 2"/>
-          <p:cNvSpPr>
-            <a:spLocks noGrp="1"/>
-          </p:cNvSpPr>
-          <p:nvPr>
-            <p:ph type="title"/>
-          </p:nvPr>
-        </p:nvSpPr>
-        <p:spPr/>
-        <p:txBody>
-          <a:bodyPr/>
-          <a:lstStyle/>
-          <a:p>
-            <a:r>
-              <a:rPr lang="en-IN" dirty="0"/>
-              <a:t>Code.fun.do AI Challenge Themes</a:t>
-            </a:r>
-          </a:p>
-        </p:txBody>
-      </p:sp>
-    </p:spTree>
-    <p:extLst>
-      <p:ext uri="{BB962C8B-B14F-4D97-AF65-F5344CB8AC3E}">
-        <p14:creationId xmlns:p14="http://schemas.microsoft.com/office/powerpoint/2010/main" val="3112895221"/>
-      </p:ext>
-    </p:extLst>
-  </p:cSld>
-  <p:clrMapOvr>
-    <a:masterClrMapping/>
-  </p:clrMapOvr>
-</p:sld>
-</file>
-
-<file path=ppt/slides/slide7.xml><?xml version="1.0" encoding="utf-8"?>
-<p:sld xmlns:a="http://schemas.openxmlformats.org/drawingml/2006/main" xmlns:r="http://schemas.openxmlformats.org/officeDocument/2006/relationships" xmlns:p="http://schemas.openxmlformats.org/presentationml/2006/main" show="0">
+<p:sld xmlns:a="http://schemas.openxmlformats.org/drawingml/2006/main" xmlns:r="http://schemas.openxmlformats.org/officeDocument/2006/relationships" xmlns:p="http://schemas.openxmlformats.org/presentationml/2006/main">
   <p:cSld>
     <p:spTree>
       <p:nvGrpSpPr>
@@ -24281,31 +23894,31 @@
           <a:p>
             <a:r>
               <a:rPr lang="en-IN" dirty="0"/>
-              <a:t>Digital India</a:t>
+              <a:t>Education</a:t>
             </a:r>
           </a:p>
           <a:p>
             <a:r>
               <a:rPr lang="en-IN" dirty="0"/>
-              <a:t>Hack for Good</a:t>
+              <a:t>Healthcare</a:t>
             </a:r>
           </a:p>
           <a:p>
             <a:r>
               <a:rPr lang="en-IN" dirty="0"/>
-              <a:t>Save Our Planet</a:t>
+              <a:t>Agriculture</a:t>
             </a:r>
           </a:p>
           <a:p>
             <a:r>
               <a:rPr lang="en-IN" dirty="0"/>
-              <a:t>Productivity</a:t>
+              <a:t>Transportation</a:t>
             </a:r>
           </a:p>
           <a:p>
             <a:r>
               <a:rPr lang="en-IN" dirty="0"/>
-              <a:t>Entertainment</a:t>
+              <a:t>Sustainability</a:t>
             </a:r>
           </a:p>
         </p:txBody>
@@ -24322,12 +23935,14 @@
         </p:nvSpPr>
         <p:spPr/>
         <p:txBody>
-          <a:bodyPr/>
+          <a:bodyPr>
+            <a:normAutofit fontScale="90000"/>
+          </a:bodyPr>
           <a:lstStyle/>
           <a:p>
             <a:r>
               <a:rPr lang="en-IN" dirty="0"/>
-              <a:t>Code.fun.do Themes</a:t>
+              <a:t>Code.fun.do AI for Social Good Challenge Themes</a:t>
             </a:r>
           </a:p>
         </p:txBody>
@@ -24345,7 +23960,7 @@
 </p:sld>
 </file>
 
-<file path=ppt/slides/slide8.xml><?xml version="1.0" encoding="utf-8"?>
+<file path=ppt/slides/slide7.xml><?xml version="1.0" encoding="utf-8"?>
 <p:sld xmlns:a="http://schemas.openxmlformats.org/drawingml/2006/main" xmlns:r="http://schemas.openxmlformats.org/officeDocument/2006/relationships" xmlns:p="http://schemas.openxmlformats.org/presentationml/2006/main">
   <p:cSld>
     <p:spTree>
@@ -24497,7 +24112,7 @@
 </p:sld>
 </file>
 
-<file path=ppt/slides/slide9.xml><?xml version="1.0" encoding="utf-8"?>
+<file path=ppt/slides/slide8.xml><?xml version="1.0" encoding="utf-8"?>
 <p:sld xmlns:a="http://schemas.openxmlformats.org/drawingml/2006/main" xmlns:r="http://schemas.openxmlformats.org/officeDocument/2006/relationships" xmlns:p="http://schemas.openxmlformats.org/presentationml/2006/main">
   <p:cSld>
     <p:spTree>
@@ -24672,6 +24287,205 @@
     <p:extLst>
       <p:ext uri="{BB962C8B-B14F-4D97-AF65-F5344CB8AC3E}">
         <p14:creationId xmlns:p14="http://schemas.microsoft.com/office/powerpoint/2010/main" val="995816888"/>
+      </p:ext>
+    </p:extLst>
+  </p:cSld>
+  <p:clrMapOvr>
+    <a:masterClrMapping/>
+  </p:clrMapOvr>
+</p:sld>
+</file>
+
+<file path=ppt/slides/slide9.xml><?xml version="1.0" encoding="utf-8"?>
+<p:sld xmlns:a="http://schemas.openxmlformats.org/drawingml/2006/main" xmlns:r="http://schemas.openxmlformats.org/officeDocument/2006/relationships" xmlns:p="http://schemas.openxmlformats.org/presentationml/2006/main">
+  <p:cSld>
+    <p:spTree>
+      <p:nvGrpSpPr>
+        <p:cNvPr id="1" name=""/>
+        <p:cNvGrpSpPr/>
+        <p:nvPr/>
+      </p:nvGrpSpPr>
+      <p:grpSpPr>
+        <a:xfrm>
+          <a:off x="0" y="0"/>
+          <a:ext cx="0" cy="0"/>
+          <a:chOff x="0" y="0"/>
+          <a:chExt cx="0" cy="0"/>
+        </a:xfrm>
+      </p:grpSpPr>
+      <p:sp>
+        <p:nvSpPr>
+          <p:cNvPr id="4" name="Title 3"/>
+          <p:cNvSpPr>
+            <a:spLocks noGrp="1"/>
+          </p:cNvSpPr>
+          <p:nvPr>
+            <p:ph type="title"/>
+          </p:nvPr>
+        </p:nvSpPr>
+        <p:spPr/>
+        <p:txBody>
+          <a:bodyPr/>
+          <a:lstStyle/>
+          <a:p>
+            <a:r>
+              <a:rPr lang="en-IN" dirty="0"/>
+              <a:t>code.fun.do Hackathon</a:t>
+            </a:r>
+          </a:p>
+        </p:txBody>
+      </p:sp>
+      <p:pic>
+        <p:nvPicPr>
+          <p:cNvPr id="5" name="Picture 4"/>
+          <p:cNvPicPr>
+            <a:picLocks noChangeAspect="1"/>
+          </p:cNvPicPr>
+          <p:nvPr/>
+        </p:nvPicPr>
+        <p:blipFill>
+          <a:blip r:embed="rId3">
+            <a:extLst>
+              <a:ext uri="{28A0092B-C50C-407E-A947-70E740481C1C}">
+                <a14:useLocalDpi xmlns:a14="http://schemas.microsoft.com/office/drawing/2010/main" val="0"/>
+              </a:ext>
+            </a:extLst>
+          </a:blip>
+          <a:stretch>
+            <a:fillRect/>
+          </a:stretch>
+        </p:blipFill>
+        <p:spPr>
+          <a:xfrm>
+            <a:off x="11024193" y="6471787"/>
+            <a:ext cx="1047135" cy="222517"/>
+          </a:xfrm>
+          <a:prstGeom prst="rect">
+            <a:avLst/>
+          </a:prstGeom>
+        </p:spPr>
+      </p:pic>
+      <p:sp>
+        <p:nvSpPr>
+          <p:cNvPr id="6" name="Content Placeholder 5"/>
+          <p:cNvSpPr>
+            <a:spLocks noGrp="1"/>
+          </p:cNvSpPr>
+          <p:nvPr>
+            <p:ph sz="half" idx="2"/>
+          </p:nvPr>
+        </p:nvSpPr>
+        <p:spPr>
+          <a:xfrm>
+            <a:off x="379511" y="1371601"/>
+            <a:ext cx="11283402" cy="4953001"/>
+          </a:xfrm>
+        </p:spPr>
+        <p:txBody>
+          <a:bodyPr>
+            <a:normAutofit fontScale="92500" lnSpcReduction="20000"/>
+          </a:bodyPr>
+          <a:lstStyle/>
+          <a:p>
+            <a:r>
+              <a:rPr lang="en-IN" dirty="0"/>
+              <a:t>Post Event</a:t>
+            </a:r>
+          </a:p>
+          <a:p>
+            <a:pPr lvl="1"/>
+            <a:r>
+              <a:rPr lang="en-IN" dirty="0"/>
+              <a:t>Submissions</a:t>
+            </a:r>
+          </a:p>
+          <a:p>
+            <a:pPr lvl="2"/>
+            <a:r>
+              <a:rPr lang="en-IN" dirty="0"/>
+              <a:t>Teams to submit their app online along with a 3min demo video</a:t>
+            </a:r>
+          </a:p>
+          <a:p>
+            <a:pPr lvl="3"/>
+            <a:r>
+              <a:rPr lang="en-US" sz="2100" dirty="0"/>
+              <a:t>Demo video should clearly highlight the functionality built in the app, along with known issues and bugs</a:t>
+            </a:r>
+          </a:p>
+          <a:p>
+            <a:pPr lvl="3"/>
+            <a:r>
+              <a:rPr lang="en-US" sz="2100" dirty="0"/>
+              <a:t>The apps should be deployable on targeted device. Include a Readme in the upload archive.</a:t>
+            </a:r>
+          </a:p>
+          <a:p>
+            <a:pPr lvl="3"/>
+            <a:r>
+              <a:rPr lang="en-US" sz="2100" dirty="0"/>
+              <a:t>Deadline – One Week from today.</a:t>
+            </a:r>
+          </a:p>
+          <a:p>
+            <a:pPr lvl="3"/>
+            <a:endParaRPr lang="en-IN" dirty="0"/>
+          </a:p>
+          <a:p>
+            <a:pPr lvl="2"/>
+            <a:r>
+              <a:rPr lang="en-US" dirty="0"/>
+              <a:t>Valid submissions will be judged by panel of Microsoft mentors</a:t>
+            </a:r>
+            <a:endParaRPr lang="en-IN" dirty="0"/>
+          </a:p>
+          <a:p>
+            <a:pPr lvl="2"/>
+            <a:endParaRPr lang="en-IN" dirty="0"/>
+          </a:p>
+          <a:p>
+            <a:pPr lvl="1"/>
+            <a:r>
+              <a:rPr lang="en-IN" dirty="0"/>
+              <a:t>Results –</a:t>
+            </a:r>
+          </a:p>
+          <a:p>
+            <a:pPr lvl="2"/>
+            <a:r>
+              <a:rPr lang="en-IN" dirty="0"/>
+              <a:t>Top teams (3) would qualify for on-campus code.fun.do with Seniors. </a:t>
+            </a:r>
+          </a:p>
+          <a:p>
+            <a:pPr lvl="2"/>
+            <a:r>
+              <a:rPr lang="en-US" dirty="0"/>
+              <a:t>T-shirt and Goodies to all successful submissions. Additional prizes for Top 3 teams.</a:t>
+            </a:r>
+          </a:p>
+          <a:p>
+            <a:pPr lvl="2"/>
+            <a:r>
+              <a:rPr lang="en-US" dirty="0"/>
+              <a:t>Chance to compete with Seniors and Win big in on-campus code.fun.do </a:t>
+            </a:r>
+            <a:endParaRPr lang="en-IN" dirty="0"/>
+          </a:p>
+          <a:p>
+            <a:pPr lvl="2"/>
+            <a:endParaRPr lang="en-IN" dirty="0"/>
+          </a:p>
+          <a:p>
+            <a:pPr lvl="1"/>
+            <a:endParaRPr lang="en-IN" dirty="0"/>
+          </a:p>
+        </p:txBody>
+      </p:sp>
+    </p:spTree>
+    <p:extLst>
+      <p:ext uri="{BB962C8B-B14F-4D97-AF65-F5344CB8AC3E}">
+        <p14:creationId xmlns:p14="http://schemas.microsoft.com/office/powerpoint/2010/main" val="701584294"/>
       </p:ext>
     </p:extLst>
   </p:cSld>

</xml_diff>